<commit_message>
Final V1.7 - adding references to presentation
</commit_message>
<xml_diff>
--- a/Presentation/Identifying Known Vulnerabilies in OSS libraries.pptx
+++ b/Presentation/Identifying Known Vulnerabilies in OSS libraries.pptx
@@ -7101,6 +7101,89 @@
           </a:p>
         </p:txBody>
       </p:sp>
+      <p:sp>
+        <p:nvSpPr>
+          <p:cNvPr id="4" name="TextBox 3">
+            <a:extLst>
+              <a:ext uri="{FF2B5EF4-FFF2-40B4-BE49-F238E27FC236}">
+                <a16:creationId xmlns:a16="http://schemas.microsoft.com/office/drawing/2014/main" id="{77ED0E02-B6F4-4940-9346-16F3F661E1A8}"/>
+              </a:ext>
+            </a:extLst>
+          </p:cNvPr>
+          <p:cNvSpPr txBox="1"/>
+          <p:nvPr/>
+        </p:nvSpPr>
+        <p:spPr>
+          <a:xfrm>
+            <a:off x="-1" y="6211669"/>
+            <a:ext cx="12188825" cy="646331"/>
+          </a:xfrm>
+          <a:prstGeom prst="rect">
+            <a:avLst/>
+          </a:prstGeom>
+          <a:noFill/>
+        </p:spPr>
+        <p:txBody>
+          <a:bodyPr wrap="square" rtlCol="0">
+            <a:spAutoFit/>
+          </a:bodyPr>
+          <a:lstStyle/>
+          <a:p>
+            <a:pPr algn="ctr"/>
+            <a:r>
+              <a:rPr lang="en-US" dirty="0"/>
+              <a:t> H. Perl, S. </a:t>
+            </a:r>
+            <a:r>
+              <a:rPr lang="en-US" dirty="0" err="1"/>
+              <a:t>Dechand</a:t>
+            </a:r>
+            <a:r>
+              <a:rPr lang="en-US" dirty="0"/>
+              <a:t>, M. Smith, D. Arp, F. Yamaguchi, K. </a:t>
+            </a:r>
+            <a:r>
+              <a:rPr lang="en-US" dirty="0" err="1"/>
+              <a:t>Rieck</a:t>
+            </a:r>
+            <a:r>
+              <a:rPr lang="en-US" dirty="0"/>
+              <a:t>, S. </a:t>
+            </a:r>
+            <a:r>
+              <a:rPr lang="en-US" dirty="0" err="1"/>
+              <a:t>Fahl</a:t>
+            </a:r>
+            <a:r>
+              <a:rPr lang="en-US" dirty="0"/>
+              <a:t>, and Y. </a:t>
+            </a:r>
+            <a:r>
+              <a:rPr lang="en-US" dirty="0" err="1"/>
+              <a:t>Acar</a:t>
+            </a:r>
+            <a:r>
+              <a:rPr lang="en-US" dirty="0"/>
+              <a:t>, </a:t>
+            </a:r>
+          </a:p>
+          <a:p>
+            <a:pPr algn="ctr"/>
+            <a:r>
+              <a:rPr lang="en-US" dirty="0"/>
+              <a:t>“</a:t>
+            </a:r>
+            <a:r>
+              <a:rPr lang="en-US" dirty="0" err="1"/>
+              <a:t>Vccﬁnder</a:t>
+            </a:r>
+            <a:r>
+              <a:rPr lang="en-US" dirty="0"/>
+              <a:t>: Finding potential vulnerabilities in open-source projects to assist code audits”</a:t>
+            </a:r>
+          </a:p>
+        </p:txBody>
+      </p:sp>
     </p:spTree>
     <p:extLst>
       <p:ext uri="{BB962C8B-B14F-4D97-AF65-F5344CB8AC3E}">
@@ -7238,6 +7321,58 @@
             <a:r>
               <a:rPr lang="en-US" dirty="0"/>
               <a:t>Only considers direct dependencies</a:t>
+            </a:r>
+          </a:p>
+        </p:txBody>
+      </p:sp>
+      <p:sp>
+        <p:nvSpPr>
+          <p:cNvPr id="4" name="TextBox 3">
+            <a:extLst>
+              <a:ext uri="{FF2B5EF4-FFF2-40B4-BE49-F238E27FC236}">
+                <a16:creationId xmlns:a16="http://schemas.microsoft.com/office/drawing/2014/main" id="{002AF1AA-122A-40BF-9DEB-E726E772B9F5}"/>
+              </a:ext>
+            </a:extLst>
+          </p:cNvPr>
+          <p:cNvSpPr txBox="1"/>
+          <p:nvPr/>
+        </p:nvSpPr>
+        <p:spPr>
+          <a:xfrm>
+            <a:off x="-1" y="6477000"/>
+            <a:ext cx="12188825" cy="369332"/>
+          </a:xfrm>
+          <a:prstGeom prst="rect">
+            <a:avLst/>
+          </a:prstGeom>
+          <a:noFill/>
+        </p:spPr>
+        <p:txBody>
+          <a:bodyPr wrap="square" rtlCol="0">
+            <a:spAutoFit/>
+          </a:bodyPr>
+          <a:lstStyle/>
+          <a:p>
+            <a:pPr algn="ctr"/>
+            <a:r>
+              <a:rPr lang="en-US" dirty="0"/>
+              <a:t> J. Cox, E. </a:t>
+            </a:r>
+            <a:r>
+              <a:rPr lang="en-US" dirty="0" err="1"/>
+              <a:t>Bouwers</a:t>
+            </a:r>
+            <a:r>
+              <a:rPr lang="en-US" dirty="0"/>
+              <a:t>, M. van </a:t>
+            </a:r>
+            <a:r>
+              <a:rPr lang="en-US" dirty="0" err="1"/>
+              <a:t>Eekelen</a:t>
+            </a:r>
+            <a:r>
+              <a:rPr lang="en-US" dirty="0"/>
+              <a:t>, and J. Visser, “Measuring dependency freshness in software systems”</a:t>
             </a:r>
           </a:p>
         </p:txBody>
@@ -7860,10 +7995,10 @@
       </p:sp>
       <p:sp>
         <p:nvSpPr>
-          <p:cNvPr id="6" name="TextBox 5">
+          <p:cNvPr id="4" name="TextBox 3">
             <a:extLst>
               <a:ext uri="{FF2B5EF4-FFF2-40B4-BE49-F238E27FC236}">
-                <a16:creationId xmlns:a16="http://schemas.microsoft.com/office/drawing/2014/main" id="{BD3A0B08-8D00-48FE-AE42-8905457A3133}"/>
+                <a16:creationId xmlns:a16="http://schemas.microsoft.com/office/drawing/2014/main" id="{8FF9D235-561E-4F97-85D5-581EDF862F8D}"/>
               </a:ext>
             </a:extLst>
           </p:cNvPr>
@@ -7872,8 +8007,8 @@
         </p:nvSpPr>
         <p:spPr>
           <a:xfrm>
-            <a:off x="2106717" y="6174217"/>
-            <a:ext cx="7975388" cy="646331"/>
+            <a:off x="15113" y="6211669"/>
+            <a:ext cx="12173712" cy="646331"/>
           </a:xfrm>
           <a:prstGeom prst="rect">
             <a:avLst/>
@@ -7881,7 +8016,7 @@
           <a:noFill/>
         </p:spPr>
         <p:txBody>
-          <a:bodyPr wrap="none" rtlCol="0">
+          <a:bodyPr wrap="square" rtlCol="0">
             <a:spAutoFit/>
           </a:bodyPr>
           <a:lstStyle/>
@@ -7889,46 +8024,22 @@
             <a:pPr algn="ctr"/>
             <a:r>
               <a:rPr lang="en-US" dirty="0"/>
-              <a:t> E. </a:t>
+              <a:t> S. E. Ponta, H. Plate, and A. </a:t>
             </a:r>
             <a:r>
               <a:rPr lang="en-US" dirty="0" err="1"/>
-              <a:t>Derr</a:t>
-            </a:r>
-            <a:r>
-              <a:rPr lang="en-US" dirty="0"/>
-              <a:t>, S. </a:t>
-            </a:r>
-            <a:r>
-              <a:rPr lang="en-US" dirty="0" err="1"/>
-              <a:t>Bugiel</a:t>
-            </a:r>
-            <a:r>
-              <a:rPr lang="en-US" dirty="0"/>
-              <a:t>, S. </a:t>
-            </a:r>
-            <a:r>
-              <a:rPr lang="en-US" dirty="0" err="1"/>
-              <a:t>Fahl</a:t>
-            </a:r>
-            <a:r>
-              <a:rPr lang="en-US" dirty="0"/>
-              <a:t>, Y. </a:t>
-            </a:r>
-            <a:r>
-              <a:rPr lang="en-US" dirty="0" err="1"/>
-              <a:t>Acar</a:t>
-            </a:r>
-            <a:r>
-              <a:rPr lang="en-US" dirty="0"/>
-              <a:t>, and M. Backes, “Keep me updated: An empirical </a:t>
+              <a:t>Sabetta</a:t>
+            </a:r>
+            <a:r>
+              <a:rPr lang="en-US" dirty="0"/>
+              <a:t>, </a:t>
             </a:r>
           </a:p>
           <a:p>
             <a:pPr algn="ctr"/>
             <a:r>
               <a:rPr lang="en-US" dirty="0"/>
-              <a:t>study of third-party library updatability on android</a:t>
+              <a:t>“Beyond metadata: Code-centric and usage-based analysis of known vulnerabilities in open-source software”</a:t>
             </a:r>
           </a:p>
         </p:txBody>

</xml_diff>